<commit_message>
updated admin Columbia with the instructions
</commit_message>
<xml_diff>
--- a/20241217_Columbia/admin/Instructions.pptx
+++ b/20241217_Columbia/admin/Instructions.pptx
@@ -259,7 +259,7 @@
           <a:p>
             <a:fld id="{1F06E6B4-D2D1-8340-BB5C-DBF76C96EA3F}" type="datetimeFigureOut">
               <a:rPr lang="en-US" smtClean="0"/>
-              <a:t>10/31/24</a:t>
+              <a:t>12/16/24</a:t>
             </a:fld>
             <a:endParaRPr lang="en-US"/>
           </a:p>
@@ -457,7 +457,7 @@
           <a:p>
             <a:fld id="{1F06E6B4-D2D1-8340-BB5C-DBF76C96EA3F}" type="datetimeFigureOut">
               <a:rPr lang="en-US" smtClean="0"/>
-              <a:t>10/31/24</a:t>
+              <a:t>12/16/24</a:t>
             </a:fld>
             <a:endParaRPr lang="en-US"/>
           </a:p>
@@ -665,7 +665,7 @@
           <a:p>
             <a:fld id="{1F06E6B4-D2D1-8340-BB5C-DBF76C96EA3F}" type="datetimeFigureOut">
               <a:rPr lang="en-US" smtClean="0"/>
-              <a:t>10/31/24</a:t>
+              <a:t>12/16/24</a:t>
             </a:fld>
             <a:endParaRPr lang="en-US"/>
           </a:p>
@@ -863,7 +863,7 @@
           <a:p>
             <a:fld id="{1F06E6B4-D2D1-8340-BB5C-DBF76C96EA3F}" type="datetimeFigureOut">
               <a:rPr lang="en-US" smtClean="0"/>
-              <a:t>10/31/24</a:t>
+              <a:t>12/16/24</a:t>
             </a:fld>
             <a:endParaRPr lang="en-US"/>
           </a:p>
@@ -1138,7 +1138,7 @@
           <a:p>
             <a:fld id="{1F06E6B4-D2D1-8340-BB5C-DBF76C96EA3F}" type="datetimeFigureOut">
               <a:rPr lang="en-US" smtClean="0"/>
-              <a:t>10/31/24</a:t>
+              <a:t>12/16/24</a:t>
             </a:fld>
             <a:endParaRPr lang="en-US"/>
           </a:p>
@@ -1403,7 +1403,7 @@
           <a:p>
             <a:fld id="{1F06E6B4-D2D1-8340-BB5C-DBF76C96EA3F}" type="datetimeFigureOut">
               <a:rPr lang="en-US" smtClean="0"/>
-              <a:t>10/31/24</a:t>
+              <a:t>12/16/24</a:t>
             </a:fld>
             <a:endParaRPr lang="en-US"/>
           </a:p>
@@ -1815,7 +1815,7 @@
           <a:p>
             <a:fld id="{1F06E6B4-D2D1-8340-BB5C-DBF76C96EA3F}" type="datetimeFigureOut">
               <a:rPr lang="en-US" smtClean="0"/>
-              <a:t>10/31/24</a:t>
+              <a:t>12/16/24</a:t>
             </a:fld>
             <a:endParaRPr lang="en-US"/>
           </a:p>
@@ -1956,7 +1956,7 @@
           <a:p>
             <a:fld id="{1F06E6B4-D2D1-8340-BB5C-DBF76C96EA3F}" type="datetimeFigureOut">
               <a:rPr lang="en-US" smtClean="0"/>
-              <a:t>10/31/24</a:t>
+              <a:t>12/16/24</a:t>
             </a:fld>
             <a:endParaRPr lang="en-US"/>
           </a:p>
@@ -2069,7 +2069,7 @@
           <a:p>
             <a:fld id="{1F06E6B4-D2D1-8340-BB5C-DBF76C96EA3F}" type="datetimeFigureOut">
               <a:rPr lang="en-US" smtClean="0"/>
-              <a:t>10/31/24</a:t>
+              <a:t>12/16/24</a:t>
             </a:fld>
             <a:endParaRPr lang="en-US"/>
           </a:p>
@@ -2380,7 +2380,7 @@
           <a:p>
             <a:fld id="{1F06E6B4-D2D1-8340-BB5C-DBF76C96EA3F}" type="datetimeFigureOut">
               <a:rPr lang="en-US" smtClean="0"/>
-              <a:t>10/31/24</a:t>
+              <a:t>12/16/24</a:t>
             </a:fld>
             <a:endParaRPr lang="en-US"/>
           </a:p>
@@ -2668,7 +2668,7 @@
           <a:p>
             <a:fld id="{1F06E6B4-D2D1-8340-BB5C-DBF76C96EA3F}" type="datetimeFigureOut">
               <a:rPr lang="en-US" smtClean="0"/>
-              <a:t>10/31/24</a:t>
+              <a:t>12/16/24</a:t>
             </a:fld>
             <a:endParaRPr lang="en-US"/>
           </a:p>
@@ -2909,7 +2909,7 @@
           <a:p>
             <a:fld id="{1F06E6B4-D2D1-8340-BB5C-DBF76C96EA3F}" type="datetimeFigureOut">
               <a:rPr lang="en-US" smtClean="0"/>
-              <a:t>10/31/24</a:t>
+              <a:t>12/16/24</a:t>
             </a:fld>
             <a:endParaRPr lang="en-US"/>
           </a:p>
@@ -3328,10 +3328,10 @@
       </p:grpSpPr>
       <p:pic>
         <p:nvPicPr>
-          <p:cNvPr id="4" name="Picture 3">
-            <a:extLst>
-              <a:ext uri="{FF2B5EF4-FFF2-40B4-BE49-F238E27FC236}">
-                <a16:creationId xmlns:a16="http://schemas.microsoft.com/office/drawing/2014/main" id="{36EAC21E-D8B3-6D43-9075-A480DF2F177F}"/>
+          <p:cNvPr id="2" name="Picture 1">
+            <a:extLst>
+              <a:ext uri="{FF2B5EF4-FFF2-40B4-BE49-F238E27FC236}">
+                <a16:creationId xmlns:a16="http://schemas.microsoft.com/office/drawing/2014/main" id="{1CCB5A54-540B-1305-5E1E-99815758967A}"/>
               </a:ext>
             </a:extLst>
           </p:cNvPr>
@@ -3348,8 +3348,8 @@
         </p:blipFill>
         <p:spPr>
           <a:xfrm>
-            <a:off x="1127067" y="0"/>
-            <a:ext cx="9937865" cy="6858000"/>
+            <a:off x="500207" y="0"/>
+            <a:ext cx="10808449" cy="6623222"/>
           </a:xfrm>
           <a:prstGeom prst="rect">
             <a:avLst/>
@@ -3370,10 +3370,10 @@
         </p:nvGrpSpPr>
         <p:grpSpPr>
           <a:xfrm>
-            <a:off x="136467" y="1652954"/>
-            <a:ext cx="3187025" cy="1752095"/>
+            <a:off x="37614" y="3111055"/>
+            <a:ext cx="3100526" cy="1752095"/>
             <a:chOff x="136467" y="1652954"/>
-            <a:chExt cx="3187025" cy="1752095"/>
+            <a:chExt cx="3100526" cy="1752095"/>
           </a:xfrm>
         </p:grpSpPr>
         <p:sp>
@@ -3390,7 +3390,7 @@
           </p:nvSpPr>
           <p:spPr>
             <a:xfrm>
-              <a:off x="1266092" y="1652954"/>
+              <a:off x="1179593" y="1652954"/>
               <a:ext cx="2057400" cy="430823"/>
             </a:xfrm>
             <a:prstGeom prst="rect">
@@ -3490,7 +3490,7 @@
           <p:spPr>
             <a:xfrm flipV="1">
               <a:off x="1127067" y="1868366"/>
-              <a:ext cx="139025" cy="336354"/>
+              <a:ext cx="52526" cy="336354"/>
             </a:xfrm>
             <a:prstGeom prst="line">
               <a:avLst/>
@@ -3531,7 +3531,7 @@
         </p:nvGrpSpPr>
         <p:grpSpPr>
           <a:xfrm>
-            <a:off x="8337452" y="2692400"/>
+            <a:off x="8189168" y="3928079"/>
             <a:ext cx="2434012" cy="1911057"/>
             <a:chOff x="1266092" y="172720"/>
             <a:chExt cx="2434012" cy="1911057"/>

</xml_diff>